<commit_message>
Added speaiker notes to consulting-careers
</commit_message>
<xml_diff>
--- a/consulting-careers/introduction.pptx
+++ b/consulting-careers/introduction.pptx
@@ -17,6 +17,16 @@
     <p:sldId id="265" r:id="rId11"/>
     <p:sldId id="266" r:id="rId12"/>
     <p:sldId id="267" r:id="rId13"/>
+    <p:sldId id="268" r:id="rId14"/>
+    <p:sldId id="269" r:id="rId15"/>
+    <p:sldId id="270" r:id="rId16"/>
+    <p:sldId id="271" r:id="rId17"/>
+    <p:sldId id="272" r:id="rId18"/>
+    <p:sldId id="273" r:id="rId19"/>
+    <p:sldId id="274" r:id="rId20"/>
+    <p:sldId id="275" r:id="rId21"/>
+    <p:sldId id="276" r:id="rId22"/>
+    <p:sldId id="277" r:id="rId23"/>
   </p:sldIdLst>
   <p:sldSz cx="9144000" cy="6858000" type="screen4x3"/>
   <p:notesSz cx="6858000" cy="9144000"/>
@@ -3733,6 +3743,1236 @@
 </p:sld>
 </file>
 
+<file path=ppt/slides/slide13.xml><?xml version="1.0" encoding="utf-8"?>
+<p:sld xmlns:a="http://schemas.openxmlformats.org/drawingml/2006/main" xmlns:r="http://schemas.openxmlformats.org/officeDocument/2006/relationships" xmlns:p="http://schemas.openxmlformats.org/presentationml/2006/main">
+  <p:cSld>
+    <p:spTree>
+      <p:nvGrpSpPr>
+        <p:cNvPr id="1" name=""/>
+        <p:cNvGrpSpPr/>
+        <p:nvPr/>
+      </p:nvGrpSpPr>
+      <p:grpSpPr>
+        <a:xfrm>
+          <a:off x="0" y="0"/>
+          <a:ext cx="0" cy="0"/>
+          <a:chOff x="0" y="0"/>
+          <a:chExt cx="0" cy="0"/>
+        </a:xfrm>
+      </p:grpSpPr>
+      <p:sp>
+        <p:nvSpPr>
+          <p:cNvPr id="2" name="Title 1"/>
+          <p:cNvSpPr>
+            <a:spLocks noGrp="1"/>
+          </p:cNvSpPr>
+          <p:nvPr>
+            <p:ph type="title"/>
+          </p:nvPr>
+        </p:nvSpPr>
+        <p:spPr/>
+        <p:txBody>
+          <a:bodyPr/>
+          <a:lstStyle/>
+          <a:p>
+            <a:pPr lvl="0" marL="0" indent="0">
+              <a:buNone/>
+            </a:pPr>
+            <a:r>
+              <a:rPr/>
+              <a:t>What</a:t>
+            </a:r>
+            <a:r>
+              <a:rPr/>
+              <a:t> </a:t>
+            </a:r>
+            <a:r>
+              <a:rPr/>
+              <a:t>were</a:t>
+            </a:r>
+            <a:r>
+              <a:rPr/>
+              <a:t> </a:t>
+            </a:r>
+            <a:r>
+              <a:rPr/>
+              <a:t>the</a:t>
+            </a:r>
+            <a:r>
+              <a:rPr/>
+              <a:t> </a:t>
+            </a:r>
+            <a:r>
+              <a:rPr/>
+              <a:t>courses</a:t>
+            </a:r>
+            <a:r>
+              <a:rPr/>
+              <a:t> </a:t>
+            </a:r>
+            <a:r>
+              <a:rPr/>
+              <a:t>you</a:t>
+            </a:r>
+            <a:r>
+              <a:rPr/>
+              <a:t> </a:t>
+            </a:r>
+            <a:r>
+              <a:rPr/>
+              <a:t>have</a:t>
+            </a:r>
+            <a:r>
+              <a:rPr/>
+              <a:t> </a:t>
+            </a:r>
+            <a:r>
+              <a:rPr/>
+              <a:t>taken</a:t>
+            </a:r>
+            <a:r>
+              <a:rPr/>
+              <a:t> </a:t>
+            </a:r>
+            <a:r>
+              <a:rPr/>
+              <a:t>that</a:t>
+            </a:r>
+            <a:r>
+              <a:rPr/>
+              <a:t> </a:t>
+            </a:r>
+            <a:r>
+              <a:rPr/>
+              <a:t>have</a:t>
+            </a:r>
+            <a:r>
+              <a:rPr/>
+              <a:t> </a:t>
+            </a:r>
+            <a:r>
+              <a:rPr/>
+              <a:t>been</a:t>
+            </a:r>
+            <a:r>
+              <a:rPr/>
+              <a:t> </a:t>
+            </a:r>
+            <a:r>
+              <a:rPr/>
+              <a:t>the</a:t>
+            </a:r>
+            <a:r>
+              <a:rPr/>
+              <a:t> </a:t>
+            </a:r>
+            <a:r>
+              <a:rPr/>
+              <a:t>most</a:t>
+            </a:r>
+            <a:r>
+              <a:rPr/>
+              <a:t> </a:t>
+            </a:r>
+            <a:r>
+              <a:rPr/>
+              <a:t>beneficial</a:t>
+            </a:r>
+            <a:r>
+              <a:rPr/>
+              <a:t> </a:t>
+            </a:r>
+            <a:r>
+              <a:rPr/>
+              <a:t>for</a:t>
+            </a:r>
+            <a:r>
+              <a:rPr/>
+              <a:t> </a:t>
+            </a:r>
+            <a:r>
+              <a:rPr/>
+              <a:t>your</a:t>
+            </a:r>
+            <a:r>
+              <a:rPr/>
+              <a:t> </a:t>
+            </a:r>
+            <a:r>
+              <a:rPr/>
+              <a:t>job?</a:t>
+            </a:r>
+          </a:p>
+        </p:txBody>
+      </p:sp>
+      <p:sp>
+        <p:nvSpPr>
+          <p:cNvPr id="3" name="Content Placeholder 2"/>
+          <p:cNvSpPr>
+            <a:spLocks noGrp="1"/>
+          </p:cNvSpPr>
+          <p:nvPr>
+            <p:ph idx="1"/>
+          </p:nvPr>
+        </p:nvSpPr>
+        <p:spPr/>
+        <p:txBody>
+          <a:bodyPr/>
+          <a:lstStyle/>
+          <a:p>
+            <a:pPr lvl="1"/>
+            <a:r>
+              <a:rPr/>
+              <a:t>Applied courses outside Department of Statistics</a:t>
+            </a:r>
+          </a:p>
+          <a:p>
+            <a:pPr lvl="2"/>
+            <a:r>
+              <a:rPr/>
+              <a:t>Biostatistics, Education</a:t>
+            </a:r>
+          </a:p>
+          <a:p>
+            <a:pPr lvl="2"/>
+            <a:r>
+              <a:rPr/>
+              <a:t>Very practical advice</a:t>
+            </a:r>
+          </a:p>
+          <a:p>
+            <a:pPr lvl="2"/>
+            <a:r>
+              <a:rPr/>
+              <a:t>Specialized perspectives ()</a:t>
+            </a:r>
+          </a:p>
+          <a:p>
+            <a:pPr lvl="1"/>
+            <a:r>
+              <a:rPr/>
+              <a:t>Theory of Mathematical Statistics</a:t>
+            </a:r>
+          </a:p>
+          <a:p>
+            <a:pPr lvl="2"/>
+            <a:r>
+              <a:rPr/>
+              <a:t>KNowing foundations increases your confidence level</a:t>
+            </a:r>
+          </a:p>
+          <a:p>
+            <a:pPr lvl="2"/>
+            <a:r>
+              <a:rPr/>
+              <a:t>Also makes you a quick learner of new methods</a:t>
+            </a:r>
+          </a:p>
+        </p:txBody>
+      </p:sp>
+    </p:spTree>
+  </p:cSld>
+</p:sld>
+</file>
+
+<file path=ppt/slides/slide14.xml><?xml version="1.0" encoding="utf-8"?>
+<p:sld xmlns:a="http://schemas.openxmlformats.org/drawingml/2006/main" xmlns:r="http://schemas.openxmlformats.org/officeDocument/2006/relationships" xmlns:p="http://schemas.openxmlformats.org/presentationml/2006/main">
+  <p:cSld>
+    <p:spTree>
+      <p:nvGrpSpPr>
+        <p:cNvPr id="1" name=""/>
+        <p:cNvGrpSpPr/>
+        <p:nvPr/>
+      </p:nvGrpSpPr>
+      <p:grpSpPr>
+        <a:xfrm>
+          <a:off x="0" y="0"/>
+          <a:ext cx="0" cy="0"/>
+          <a:chOff x="0" y="0"/>
+          <a:chExt cx="0" cy="0"/>
+        </a:xfrm>
+      </p:grpSpPr>
+      <p:sp>
+        <p:nvSpPr>
+          <p:cNvPr id="2" name="Title 1"/>
+          <p:cNvSpPr>
+            <a:spLocks noGrp="1"/>
+          </p:cNvSpPr>
+          <p:nvPr>
+            <p:ph type="title"/>
+          </p:nvPr>
+        </p:nvSpPr>
+        <p:spPr/>
+        <p:txBody>
+          <a:bodyPr/>
+          <a:lstStyle/>
+          <a:p>
+            <a:pPr lvl="0" marL="0" indent="0">
+              <a:buNone/>
+            </a:pPr>
+            <a:r>
+              <a:rPr/>
+              <a:t>Which</a:t>
+            </a:r>
+            <a:r>
+              <a:rPr/>
+              <a:t> </a:t>
+            </a:r>
+            <a:r>
+              <a:rPr/>
+              <a:t>aspects</a:t>
+            </a:r>
+            <a:r>
+              <a:rPr/>
+              <a:t> </a:t>
+            </a:r>
+            <a:r>
+              <a:rPr/>
+              <a:t>of</a:t>
+            </a:r>
+            <a:r>
+              <a:rPr/>
+              <a:t> </a:t>
+            </a:r>
+            <a:r>
+              <a:rPr/>
+              <a:t>your</a:t>
+            </a:r>
+            <a:r>
+              <a:rPr/>
+              <a:t> </a:t>
+            </a:r>
+            <a:r>
+              <a:rPr/>
+              <a:t>work</a:t>
+            </a:r>
+            <a:r>
+              <a:rPr/>
+              <a:t> </a:t>
+            </a:r>
+            <a:r>
+              <a:rPr/>
+              <a:t>did</a:t>
+            </a:r>
+            <a:r>
+              <a:rPr/>
+              <a:t> </a:t>
+            </a:r>
+            <a:r>
+              <a:rPr/>
+              <a:t>you</a:t>
+            </a:r>
+            <a:r>
+              <a:rPr/>
+              <a:t> </a:t>
+            </a:r>
+            <a:r>
+              <a:rPr/>
+              <a:t>learn</a:t>
+            </a:r>
+            <a:r>
+              <a:rPr/>
+              <a:t> </a:t>
+            </a:r>
+            <a:r>
+              <a:rPr/>
+              <a:t>on</a:t>
+            </a:r>
+            <a:r>
+              <a:rPr/>
+              <a:t> </a:t>
+            </a:r>
+            <a:r>
+              <a:rPr/>
+              <a:t>the</a:t>
+            </a:r>
+            <a:r>
+              <a:rPr/>
+              <a:t> </a:t>
+            </a:r>
+            <a:r>
+              <a:rPr/>
+              <a:t>job?</a:t>
+            </a:r>
+          </a:p>
+        </p:txBody>
+      </p:sp>
+    </p:spTree>
+  </p:cSld>
+</p:sld>
+</file>
+
+<file path=ppt/slides/slide15.xml><?xml version="1.0" encoding="utf-8"?>
+<p:sld xmlns:a="http://schemas.openxmlformats.org/drawingml/2006/main" xmlns:r="http://schemas.openxmlformats.org/officeDocument/2006/relationships" xmlns:p="http://schemas.openxmlformats.org/presentationml/2006/main">
+  <p:cSld>
+    <p:spTree>
+      <p:nvGrpSpPr>
+        <p:cNvPr id="1" name=""/>
+        <p:cNvGrpSpPr/>
+        <p:nvPr/>
+      </p:nvGrpSpPr>
+      <p:grpSpPr>
+        <a:xfrm>
+          <a:off x="0" y="0"/>
+          <a:ext cx="0" cy="0"/>
+          <a:chOff x="0" y="0"/>
+          <a:chExt cx="0" cy="0"/>
+        </a:xfrm>
+      </p:grpSpPr>
+      <p:sp>
+        <p:nvSpPr>
+          <p:cNvPr id="2" name="Title 1"/>
+          <p:cNvSpPr>
+            <a:spLocks noGrp="1"/>
+          </p:cNvSpPr>
+          <p:nvPr>
+            <p:ph type="title"/>
+          </p:nvPr>
+        </p:nvSpPr>
+        <p:spPr/>
+        <p:txBody>
+          <a:bodyPr/>
+          <a:lstStyle/>
+          <a:p>
+            <a:pPr lvl="0" marL="0" indent="0">
+              <a:buNone/>
+            </a:pPr>
+            <a:r>
+              <a:rPr/>
+              <a:t>What,</a:t>
+            </a:r>
+            <a:r>
+              <a:rPr/>
+              <a:t> </a:t>
+            </a:r>
+            <a:r>
+              <a:rPr/>
+              <a:t>if</a:t>
+            </a:r>
+            <a:r>
+              <a:rPr/>
+              <a:t> </a:t>
+            </a:r>
+            <a:r>
+              <a:rPr/>
+              <a:t>anything,</a:t>
+            </a:r>
+            <a:r>
+              <a:rPr/>
+              <a:t> </a:t>
+            </a:r>
+            <a:r>
+              <a:rPr/>
+              <a:t>do</a:t>
+            </a:r>
+            <a:r>
+              <a:rPr/>
+              <a:t> </a:t>
+            </a:r>
+            <a:r>
+              <a:rPr/>
+              <a:t>you</a:t>
+            </a:r>
+            <a:r>
+              <a:rPr/>
+              <a:t> </a:t>
+            </a:r>
+            <a:r>
+              <a:rPr/>
+              <a:t>wish</a:t>
+            </a:r>
+            <a:r>
+              <a:rPr/>
+              <a:t> </a:t>
+            </a:r>
+            <a:r>
+              <a:rPr/>
+              <a:t>you</a:t>
+            </a:r>
+            <a:r>
+              <a:rPr/>
+              <a:t> </a:t>
+            </a:r>
+            <a:r>
+              <a:rPr/>
+              <a:t>knew</a:t>
+            </a:r>
+            <a:r>
+              <a:rPr/>
+              <a:t> </a:t>
+            </a:r>
+            <a:r>
+              <a:rPr/>
+              <a:t>before</a:t>
+            </a:r>
+            <a:r>
+              <a:rPr/>
+              <a:t> </a:t>
+            </a:r>
+            <a:r>
+              <a:rPr/>
+              <a:t>entering</a:t>
+            </a:r>
+            <a:r>
+              <a:rPr/>
+              <a:t> </a:t>
+            </a:r>
+            <a:r>
+              <a:rPr/>
+              <a:t>the</a:t>
+            </a:r>
+            <a:r>
+              <a:rPr/>
+              <a:t> </a:t>
+            </a:r>
+            <a:r>
+              <a:rPr/>
+              <a:t>workforce</a:t>
+            </a:r>
+            <a:r>
+              <a:rPr/>
+              <a:t> </a:t>
+            </a:r>
+            <a:r>
+              <a:rPr/>
+              <a:t>or</a:t>
+            </a:r>
+            <a:r>
+              <a:rPr/>
+              <a:t> </a:t>
+            </a:r>
+            <a:r>
+              <a:rPr/>
+              <a:t>taking</a:t>
+            </a:r>
+            <a:r>
+              <a:rPr/>
+              <a:t> </a:t>
+            </a:r>
+            <a:r>
+              <a:rPr/>
+              <a:t>your</a:t>
+            </a:r>
+            <a:r>
+              <a:rPr/>
+              <a:t> </a:t>
+            </a:r>
+            <a:r>
+              <a:rPr/>
+              <a:t>current</a:t>
+            </a:r>
+            <a:r>
+              <a:rPr/>
+              <a:t> </a:t>
+            </a:r>
+            <a:r>
+              <a:rPr/>
+              <a:t>position?</a:t>
+            </a:r>
+          </a:p>
+        </p:txBody>
+      </p:sp>
+    </p:spTree>
+  </p:cSld>
+</p:sld>
+</file>
+
+<file path=ppt/slides/slide16.xml><?xml version="1.0" encoding="utf-8"?>
+<p:sld xmlns:a="http://schemas.openxmlformats.org/drawingml/2006/main" xmlns:r="http://schemas.openxmlformats.org/officeDocument/2006/relationships" xmlns:p="http://schemas.openxmlformats.org/presentationml/2006/main">
+  <p:cSld>
+    <p:spTree>
+      <p:nvGrpSpPr>
+        <p:cNvPr id="1" name=""/>
+        <p:cNvGrpSpPr/>
+        <p:nvPr/>
+      </p:nvGrpSpPr>
+      <p:grpSpPr>
+        <a:xfrm>
+          <a:off x="0" y="0"/>
+          <a:ext cx="0" cy="0"/>
+          <a:chOff x="0" y="0"/>
+          <a:chExt cx="0" cy="0"/>
+        </a:xfrm>
+      </p:grpSpPr>
+      <p:sp>
+        <p:nvSpPr>
+          <p:cNvPr id="2" name="Title 1"/>
+          <p:cNvSpPr>
+            <a:spLocks noGrp="1"/>
+          </p:cNvSpPr>
+          <p:nvPr>
+            <p:ph type="title"/>
+          </p:nvPr>
+        </p:nvSpPr>
+        <p:spPr/>
+        <p:txBody>
+          <a:bodyPr/>
+          <a:lstStyle/>
+          <a:p>
+            <a:pPr lvl="0" marL="0" indent="0">
+              <a:buNone/>
+            </a:pPr>
+            <a:r>
+              <a:rPr/>
+              <a:t>How</a:t>
+            </a:r>
+            <a:r>
+              <a:rPr/>
+              <a:t> </a:t>
+            </a:r>
+            <a:r>
+              <a:rPr/>
+              <a:t>much</a:t>
+            </a:r>
+            <a:r>
+              <a:rPr/>
+              <a:t> </a:t>
+            </a:r>
+            <a:r>
+              <a:rPr/>
+              <a:t>should</a:t>
+            </a:r>
+            <a:r>
+              <a:rPr/>
+              <a:t> </a:t>
+            </a:r>
+            <a:r>
+              <a:rPr/>
+              <a:t>an</a:t>
+            </a:r>
+            <a:r>
+              <a:rPr/>
+              <a:t> </a:t>
+            </a:r>
+            <a:r>
+              <a:rPr/>
+              <a:t>entry</a:t>
+            </a:r>
+            <a:r>
+              <a:rPr/>
+              <a:t> </a:t>
+            </a:r>
+            <a:r>
+              <a:rPr/>
+              <a:t>level</a:t>
+            </a:r>
+            <a:r>
+              <a:rPr/>
+              <a:t> </a:t>
+            </a:r>
+            <a:r>
+              <a:rPr/>
+              <a:t>statistician</a:t>
+            </a:r>
+            <a:r>
+              <a:rPr/>
+              <a:t> </a:t>
+            </a:r>
+            <a:r>
+              <a:rPr/>
+              <a:t>expect</a:t>
+            </a:r>
+            <a:r>
+              <a:rPr/>
+              <a:t> </a:t>
+            </a:r>
+            <a:r>
+              <a:rPr/>
+              <a:t>to</a:t>
+            </a:r>
+            <a:r>
+              <a:rPr/>
+              <a:t> </a:t>
+            </a:r>
+            <a:r>
+              <a:rPr/>
+              <a:t>make</a:t>
+            </a:r>
+            <a:r>
+              <a:rPr/>
+              <a:t> </a:t>
+            </a:r>
+            <a:r>
+              <a:rPr/>
+              <a:t>in</a:t>
+            </a:r>
+            <a:r>
+              <a:rPr/>
+              <a:t> </a:t>
+            </a:r>
+            <a:r>
+              <a:rPr/>
+              <a:t>your</a:t>
+            </a:r>
+            <a:r>
+              <a:rPr/>
+              <a:t> </a:t>
+            </a:r>
+            <a:r>
+              <a:rPr/>
+              <a:t>field?</a:t>
+            </a:r>
+            <a:r>
+              <a:rPr/>
+              <a:t> </a:t>
+            </a:r>
+            <a:r>
+              <a:rPr/>
+              <a:t>After</a:t>
+            </a:r>
+            <a:r>
+              <a:rPr/>
+              <a:t> </a:t>
+            </a:r>
+            <a:r>
+              <a:rPr/>
+              <a:t>5</a:t>
+            </a:r>
+            <a:r>
+              <a:rPr/>
+              <a:t> </a:t>
+            </a:r>
+            <a:r>
+              <a:rPr/>
+              <a:t>years</a:t>
+            </a:r>
+            <a:r>
+              <a:rPr/>
+              <a:t> </a:t>
+            </a:r>
+            <a:r>
+              <a:rPr/>
+              <a:t>of</a:t>
+            </a:r>
+            <a:r>
+              <a:rPr/>
+              <a:t> </a:t>
+            </a:r>
+            <a:r>
+              <a:rPr/>
+              <a:t>experience?</a:t>
+            </a:r>
+          </a:p>
+        </p:txBody>
+      </p:sp>
+      <p:sp>
+        <p:nvSpPr>
+          <p:cNvPr id="3" name="Content Placeholder 2"/>
+          <p:cNvSpPr>
+            <a:spLocks noGrp="1"/>
+          </p:cNvSpPr>
+          <p:nvPr>
+            <p:ph idx="1"/>
+          </p:nvPr>
+        </p:nvSpPr>
+        <p:spPr/>
+        <p:txBody>
+          <a:bodyPr/>
+          <a:lstStyle/>
+          <a:p>
+            <a:pPr lvl="1"/>
+            <a:r>
+              <a:rPr/>
+              <a:t>Outside my area of expertise (sorry!)</a:t>
+            </a:r>
+          </a:p>
+          <a:p>
+            <a:pPr lvl="2"/>
+            <a:r>
+              <a:rPr/>
+              <a:t>See various salary surveys</a:t>
+            </a:r>
+          </a:p>
+        </p:txBody>
+      </p:sp>
+    </p:spTree>
+  </p:cSld>
+</p:sld>
+</file>
+
+<file path=ppt/slides/slide17.xml><?xml version="1.0" encoding="utf-8"?>
+<p:sld xmlns:a="http://schemas.openxmlformats.org/drawingml/2006/main" xmlns:r="http://schemas.openxmlformats.org/officeDocument/2006/relationships" xmlns:p="http://schemas.openxmlformats.org/presentationml/2006/main">
+  <p:cSld>
+    <p:spTree>
+      <p:nvGrpSpPr>
+        <p:cNvPr id="1" name=""/>
+        <p:cNvGrpSpPr/>
+        <p:nvPr/>
+      </p:nvGrpSpPr>
+      <p:grpSpPr>
+        <a:xfrm>
+          <a:off x="0" y="0"/>
+          <a:ext cx="0" cy="0"/>
+          <a:chOff x="0" y="0"/>
+          <a:chExt cx="0" cy="0"/>
+        </a:xfrm>
+      </p:grpSpPr>
+      <p:sp>
+        <p:nvSpPr>
+          <p:cNvPr id="2" name="Title 1"/>
+          <p:cNvSpPr>
+            <a:spLocks noGrp="1"/>
+          </p:cNvSpPr>
+          <p:nvPr>
+            <p:ph type="title"/>
+          </p:nvPr>
+        </p:nvSpPr>
+        <p:spPr/>
+        <p:txBody>
+          <a:bodyPr/>
+          <a:lstStyle/>
+          <a:p>
+            <a:pPr lvl="0" marL="0" indent="0">
+              <a:buNone/>
+            </a:pPr>
+            <a:r>
+              <a:rPr/>
+              <a:t>What</a:t>
+            </a:r>
+            <a:r>
+              <a:rPr/>
+              <a:t> </a:t>
+            </a:r>
+            <a:r>
+              <a:rPr/>
+              <a:t>do</a:t>
+            </a:r>
+            <a:r>
+              <a:rPr/>
+              <a:t> </a:t>
+            </a:r>
+            <a:r>
+              <a:rPr/>
+              <a:t>you</a:t>
+            </a:r>
+            <a:r>
+              <a:rPr/>
+              <a:t> </a:t>
+            </a:r>
+            <a:r>
+              <a:rPr/>
+              <a:t>recommend</a:t>
+            </a:r>
+            <a:r>
+              <a:rPr/>
+              <a:t> </a:t>
+            </a:r>
+            <a:r>
+              <a:rPr/>
+              <a:t>as</a:t>
+            </a:r>
+            <a:r>
+              <a:rPr/>
+              <a:t> </a:t>
+            </a:r>
+            <a:r>
+              <a:rPr/>
+              <a:t>the</a:t>
+            </a:r>
+            <a:r>
+              <a:rPr/>
+              <a:t> </a:t>
+            </a:r>
+            <a:r>
+              <a:rPr/>
+              <a:t>best</a:t>
+            </a:r>
+            <a:r>
+              <a:rPr/>
+              <a:t> </a:t>
+            </a:r>
+            <a:r>
+              <a:rPr/>
+              <a:t>places</a:t>
+            </a:r>
+            <a:r>
+              <a:rPr/>
+              <a:t> </a:t>
+            </a:r>
+            <a:r>
+              <a:rPr/>
+              <a:t>to</a:t>
+            </a:r>
+            <a:r>
+              <a:rPr/>
+              <a:t> </a:t>
+            </a:r>
+            <a:r>
+              <a:rPr/>
+              <a:t>look</a:t>
+            </a:r>
+            <a:r>
+              <a:rPr/>
+              <a:t> </a:t>
+            </a:r>
+            <a:r>
+              <a:rPr/>
+              <a:t>for</a:t>
+            </a:r>
+            <a:r>
+              <a:rPr/>
+              <a:t> </a:t>
+            </a:r>
+            <a:r>
+              <a:rPr/>
+              <a:t>new</a:t>
+            </a:r>
+            <a:r>
+              <a:rPr/>
+              <a:t> </a:t>
+            </a:r>
+            <a:r>
+              <a:rPr/>
+              <a:t>job</a:t>
+            </a:r>
+            <a:r>
+              <a:rPr/>
+              <a:t> </a:t>
+            </a:r>
+            <a:r>
+              <a:rPr/>
+              <a:t>opportunities?</a:t>
+            </a:r>
+          </a:p>
+        </p:txBody>
+      </p:sp>
+      <p:sp>
+        <p:nvSpPr>
+          <p:cNvPr id="3" name="Content Placeholder 2"/>
+          <p:cNvSpPr>
+            <a:spLocks noGrp="1"/>
+          </p:cNvSpPr>
+          <p:nvPr>
+            <p:ph idx="1"/>
+          </p:nvPr>
+        </p:nvSpPr>
+        <p:spPr/>
+        <p:txBody>
+          <a:bodyPr/>
+          <a:lstStyle/>
+          <a:p>
+            <a:pPr lvl="1"/>
+            <a:r>
+              <a:rPr/>
+              <a:t>Outside my area of expertise (sorry!)</a:t>
+            </a:r>
+          </a:p>
+        </p:txBody>
+      </p:sp>
+    </p:spTree>
+  </p:cSld>
+</p:sld>
+</file>
+
+<file path=ppt/slides/slide18.xml><?xml version="1.0" encoding="utf-8"?>
+<p:sld xmlns:a="http://schemas.openxmlformats.org/drawingml/2006/main" xmlns:r="http://schemas.openxmlformats.org/officeDocument/2006/relationships" xmlns:p="http://schemas.openxmlformats.org/presentationml/2006/main">
+  <p:cSld>
+    <p:spTree>
+      <p:nvGrpSpPr>
+        <p:cNvPr id="1" name=""/>
+        <p:cNvGrpSpPr/>
+        <p:nvPr/>
+      </p:nvGrpSpPr>
+      <p:grpSpPr>
+        <a:xfrm>
+          <a:off x="0" y="0"/>
+          <a:ext cx="0" cy="0"/>
+          <a:chOff x="0" y="0"/>
+          <a:chExt cx="0" cy="0"/>
+        </a:xfrm>
+      </p:grpSpPr>
+      <p:sp>
+        <p:nvSpPr>
+          <p:cNvPr id="2" name="Title 1"/>
+          <p:cNvSpPr>
+            <a:spLocks noGrp="1"/>
+          </p:cNvSpPr>
+          <p:nvPr>
+            <p:ph type="title"/>
+          </p:nvPr>
+        </p:nvSpPr>
+        <p:spPr/>
+        <p:txBody>
+          <a:bodyPr/>
+          <a:lstStyle/>
+          <a:p>
+            <a:pPr lvl="0" marL="0" indent="0">
+              <a:buNone/>
+            </a:pPr>
+            <a:r>
+              <a:rPr/>
+              <a:t>How</a:t>
+            </a:r>
+            <a:r>
+              <a:rPr/>
+              <a:t> </a:t>
+            </a:r>
+            <a:r>
+              <a:rPr/>
+              <a:t>do</a:t>
+            </a:r>
+            <a:r>
+              <a:rPr/>
+              <a:t> </a:t>
+            </a:r>
+            <a:r>
+              <a:rPr/>
+              <a:t>you</a:t>
+            </a:r>
+            <a:r>
+              <a:rPr/>
+              <a:t> </a:t>
+            </a:r>
+            <a:r>
+              <a:rPr/>
+              <a:t>find</a:t>
+            </a:r>
+            <a:r>
+              <a:rPr/>
+              <a:t> </a:t>
+            </a:r>
+            <a:r>
+              <a:rPr/>
+              <a:t>your</a:t>
+            </a:r>
+            <a:r>
+              <a:rPr/>
+              <a:t> </a:t>
+            </a:r>
+            <a:r>
+              <a:rPr/>
+              <a:t>clients/collaborators?</a:t>
+            </a:r>
+          </a:p>
+        </p:txBody>
+      </p:sp>
+      <p:sp>
+        <p:nvSpPr>
+          <p:cNvPr id="3" name="Content Placeholder 2"/>
+          <p:cNvSpPr>
+            <a:spLocks noGrp="1"/>
+          </p:cNvSpPr>
+          <p:nvPr>
+            <p:ph idx="1"/>
+          </p:nvPr>
+        </p:nvSpPr>
+        <p:spPr/>
+        <p:txBody>
+          <a:bodyPr/>
+          <a:lstStyle/>
+          <a:p>
+            <a:pPr lvl="1"/>
+            <a:r>
+              <a:rPr/>
+              <a:t>Word of mouth</a:t>
+            </a:r>
+          </a:p>
+          <a:p>
+            <a:pPr lvl="2"/>
+            <a:r>
+              <a:rPr/>
+              <a:t>Let everyone know you are looking</a:t>
+            </a:r>
+          </a:p>
+          <a:p>
+            <a:pPr lvl="1"/>
+            <a:r>
+              <a:rPr/>
+              <a:t>Increase your visibility</a:t>
+            </a:r>
+          </a:p>
+          <a:p>
+            <a:pPr lvl="2"/>
+            <a:r>
+              <a:rPr/>
+              <a:t>Blogs</a:t>
+            </a:r>
+          </a:p>
+          <a:p>
+            <a:pPr lvl="2"/>
+            <a:r>
+              <a:rPr/>
+              <a:t>Social media</a:t>
+            </a:r>
+          </a:p>
+          <a:p>
+            <a:pPr lvl="2"/>
+            <a:r>
+              <a:rPr/>
+              <a:t>Presentations</a:t>
+            </a:r>
+          </a:p>
+          <a:p>
+            <a:pPr lvl="2"/>
+            <a:r>
+              <a:rPr/>
+              <a:t>Volunteer</a:t>
+            </a:r>
+          </a:p>
+        </p:txBody>
+      </p:sp>
+    </p:spTree>
+  </p:cSld>
+</p:sld>
+</file>
+
+<file path=ppt/slides/slide19.xml><?xml version="1.0" encoding="utf-8"?>
+<p:sld xmlns:a="http://schemas.openxmlformats.org/drawingml/2006/main" xmlns:r="http://schemas.openxmlformats.org/officeDocument/2006/relationships" xmlns:p="http://schemas.openxmlformats.org/presentationml/2006/main">
+  <p:cSld>
+    <p:spTree>
+      <p:nvGrpSpPr>
+        <p:cNvPr id="1" name=""/>
+        <p:cNvGrpSpPr/>
+        <p:nvPr/>
+      </p:nvGrpSpPr>
+      <p:grpSpPr>
+        <a:xfrm>
+          <a:off x="0" y="0"/>
+          <a:ext cx="0" cy="0"/>
+          <a:chOff x="0" y="0"/>
+          <a:chExt cx="0" cy="0"/>
+        </a:xfrm>
+      </p:grpSpPr>
+      <p:sp>
+        <p:nvSpPr>
+          <p:cNvPr id="2" name="Title 1"/>
+          <p:cNvSpPr>
+            <a:spLocks noGrp="1"/>
+          </p:cNvSpPr>
+          <p:nvPr>
+            <p:ph type="title"/>
+          </p:nvPr>
+        </p:nvSpPr>
+        <p:spPr/>
+        <p:txBody>
+          <a:bodyPr/>
+          <a:lstStyle/>
+          <a:p>
+            <a:pPr lvl="0" marL="0" indent="0">
+              <a:buNone/>
+            </a:pPr>
+            <a:r>
+              <a:rPr/>
+              <a:t>What</a:t>
+            </a:r>
+            <a:r>
+              <a:rPr/>
+              <a:t> </a:t>
+            </a:r>
+            <a:r>
+              <a:rPr/>
+              <a:t>advice</a:t>
+            </a:r>
+            <a:r>
+              <a:rPr/>
+              <a:t> </a:t>
+            </a:r>
+            <a:r>
+              <a:rPr/>
+              <a:t>do</a:t>
+            </a:r>
+            <a:r>
+              <a:rPr/>
+              <a:t> </a:t>
+            </a:r>
+            <a:r>
+              <a:rPr/>
+              <a:t>you</a:t>
+            </a:r>
+            <a:r>
+              <a:rPr/>
+              <a:t> </a:t>
+            </a:r>
+            <a:r>
+              <a:rPr/>
+              <a:t>have</a:t>
+            </a:r>
+            <a:r>
+              <a:rPr/>
+              <a:t> </a:t>
+            </a:r>
+            <a:r>
+              <a:rPr/>
+              <a:t>to</a:t>
+            </a:r>
+            <a:r>
+              <a:rPr/>
+              <a:t> </a:t>
+            </a:r>
+            <a:r>
+              <a:rPr/>
+              <a:t>give</a:t>
+            </a:r>
+            <a:r>
+              <a:rPr/>
+              <a:t> </a:t>
+            </a:r>
+            <a:r>
+              <a:rPr/>
+              <a:t>regarding</a:t>
+            </a:r>
+            <a:r>
+              <a:rPr/>
+              <a:t> </a:t>
+            </a:r>
+            <a:r>
+              <a:rPr/>
+              <a:t>balancing</a:t>
+            </a:r>
+            <a:r>
+              <a:rPr/>
+              <a:t> </a:t>
+            </a:r>
+            <a:r>
+              <a:rPr/>
+              <a:t>competing</a:t>
+            </a:r>
+            <a:r>
+              <a:rPr/>
+              <a:t> </a:t>
+            </a:r>
+            <a:r>
+              <a:rPr/>
+              <a:t>priorities?</a:t>
+            </a:r>
+          </a:p>
+        </p:txBody>
+      </p:sp>
+      <p:sp>
+        <p:nvSpPr>
+          <p:cNvPr id="3" name="Content Placeholder 2"/>
+          <p:cNvSpPr>
+            <a:spLocks noGrp="1"/>
+          </p:cNvSpPr>
+          <p:nvPr>
+            <p:ph idx="1"/>
+          </p:nvPr>
+        </p:nvSpPr>
+        <p:spPr/>
+        <p:txBody>
+          <a:bodyPr/>
+          <a:lstStyle/>
+          <a:p>
+            <a:pPr lvl="1"/>
+            <a:r>
+              <a:rPr/>
+              <a:t>Life is short. Do the fun stuff first.</a:t>
+            </a:r>
+          </a:p>
+          <a:p>
+            <a:pPr lvl="1"/>
+            <a:r>
+              <a:rPr/>
+              <a:t>Ask your boss for priorities</a:t>
+            </a:r>
+          </a:p>
+        </p:txBody>
+      </p:sp>
+    </p:spTree>
+  </p:cSld>
+</p:sld>
+</file>
+
 <file path=ppt/slides/slide2.xml><?xml version="1.0" encoding="utf-8"?>
 <p:sld xmlns:a="http://schemas.openxmlformats.org/drawingml/2006/main" xmlns:r="http://schemas.openxmlformats.org/officeDocument/2006/relationships" xmlns:p="http://schemas.openxmlformats.org/presentationml/2006/main">
   <p:cSld>
@@ -3913,6 +5153,666 @@
                 <a:hlinkClick r:id="rId3"/>
               </a:rPr>
               <a:t>https://github.com/pmean/resume</a:t>
+            </a:r>
+          </a:p>
+        </p:txBody>
+      </p:sp>
+    </p:spTree>
+  </p:cSld>
+</p:sld>
+</file>
+
+<file path=ppt/slides/slide20.xml><?xml version="1.0" encoding="utf-8"?>
+<p:sld xmlns:a="http://schemas.openxmlformats.org/drawingml/2006/main" xmlns:r="http://schemas.openxmlformats.org/officeDocument/2006/relationships" xmlns:p="http://schemas.openxmlformats.org/presentationml/2006/main">
+  <p:cSld>
+    <p:spTree>
+      <p:nvGrpSpPr>
+        <p:cNvPr id="1" name=""/>
+        <p:cNvGrpSpPr/>
+        <p:nvPr/>
+      </p:nvGrpSpPr>
+      <p:grpSpPr>
+        <a:xfrm>
+          <a:off x="0" y="0"/>
+          <a:ext cx="0" cy="0"/>
+          <a:chOff x="0" y="0"/>
+          <a:chExt cx="0" cy="0"/>
+        </a:xfrm>
+      </p:grpSpPr>
+      <p:sp>
+        <p:nvSpPr>
+          <p:cNvPr id="2" name="Title 1"/>
+          <p:cNvSpPr>
+            <a:spLocks noGrp="1"/>
+          </p:cNvSpPr>
+          <p:nvPr>
+            <p:ph type="title"/>
+          </p:nvPr>
+        </p:nvSpPr>
+        <p:spPr/>
+        <p:txBody>
+          <a:bodyPr/>
+          <a:lstStyle/>
+          <a:p>
+            <a:pPr lvl="0" marL="0" indent="0">
+              <a:buNone/>
+            </a:pPr>
+            <a:r>
+              <a:rPr/>
+              <a:t>What</a:t>
+            </a:r>
+            <a:r>
+              <a:rPr/>
+              <a:t> </a:t>
+            </a:r>
+            <a:r>
+              <a:rPr/>
+              <a:t>do</a:t>
+            </a:r>
+            <a:r>
+              <a:rPr/>
+              <a:t> </a:t>
+            </a:r>
+            <a:r>
+              <a:rPr/>
+              <a:t>you</a:t>
+            </a:r>
+            <a:r>
+              <a:rPr/>
+              <a:t> </a:t>
+            </a:r>
+            <a:r>
+              <a:rPr/>
+              <a:t>do</a:t>
+            </a:r>
+            <a:r>
+              <a:rPr/>
+              <a:t> </a:t>
+            </a:r>
+            <a:r>
+              <a:rPr/>
+              <a:t>when</a:t>
+            </a:r>
+            <a:r>
+              <a:rPr/>
+              <a:t> </a:t>
+            </a:r>
+            <a:r>
+              <a:rPr/>
+              <a:t>you</a:t>
+            </a:r>
+            <a:r>
+              <a:rPr/>
+              <a:t> </a:t>
+            </a:r>
+            <a:r>
+              <a:rPr/>
+              <a:t>have</a:t>
+            </a:r>
+            <a:r>
+              <a:rPr/>
+              <a:t> </a:t>
+            </a:r>
+            <a:r>
+              <a:rPr/>
+              <a:t>a</a:t>
+            </a:r>
+            <a:r>
+              <a:rPr/>
+              <a:t> </a:t>
+            </a:r>
+            <a:r>
+              <a:rPr/>
+              <a:t>project</a:t>
+            </a:r>
+            <a:r>
+              <a:rPr/>
+              <a:t> </a:t>
+            </a:r>
+            <a:r>
+              <a:rPr/>
+              <a:t>that</a:t>
+            </a:r>
+            <a:r>
+              <a:rPr/>
+              <a:t> </a:t>
+            </a:r>
+            <a:r>
+              <a:rPr/>
+              <a:t>is</a:t>
+            </a:r>
+            <a:r>
+              <a:rPr/>
+              <a:t> </a:t>
+            </a:r>
+            <a:r>
+              <a:rPr/>
+              <a:t>outside</a:t>
+            </a:r>
+            <a:r>
+              <a:rPr/>
+              <a:t> </a:t>
+            </a:r>
+            <a:r>
+              <a:rPr/>
+              <a:t>your</a:t>
+            </a:r>
+            <a:r>
+              <a:rPr/>
+              <a:t> </a:t>
+            </a:r>
+            <a:r>
+              <a:rPr/>
+              <a:t>level</a:t>
+            </a:r>
+            <a:r>
+              <a:rPr/>
+              <a:t> </a:t>
+            </a:r>
+            <a:r>
+              <a:rPr/>
+              <a:t>of</a:t>
+            </a:r>
+            <a:r>
+              <a:rPr/>
+              <a:t> </a:t>
+            </a:r>
+            <a:r>
+              <a:rPr/>
+              <a:t>expertise</a:t>
+            </a:r>
+            <a:r>
+              <a:rPr/>
+              <a:t> </a:t>
+            </a:r>
+            <a:r>
+              <a:rPr/>
+              <a:t>(who</a:t>
+            </a:r>
+            <a:r>
+              <a:rPr/>
+              <a:t> </a:t>
+            </a:r>
+            <a:r>
+              <a:rPr/>
+              <a:t>or</a:t>
+            </a:r>
+            <a:r>
+              <a:rPr/>
+              <a:t> </a:t>
+            </a:r>
+            <a:r>
+              <a:rPr/>
+              <a:t>what</a:t>
+            </a:r>
+            <a:r>
+              <a:rPr/>
+              <a:t> </a:t>
+            </a:r>
+            <a:r>
+              <a:rPr/>
+              <a:t>resources</a:t>
+            </a:r>
+            <a:r>
+              <a:rPr/>
+              <a:t> </a:t>
+            </a:r>
+            <a:r>
+              <a:rPr/>
+              <a:t>do</a:t>
+            </a:r>
+            <a:r>
+              <a:rPr/>
+              <a:t> </a:t>
+            </a:r>
+            <a:r>
+              <a:rPr/>
+              <a:t>you</a:t>
+            </a:r>
+            <a:r>
+              <a:rPr/>
+              <a:t> </a:t>
+            </a:r>
+            <a:r>
+              <a:rPr/>
+              <a:t>consult)?</a:t>
+            </a:r>
+          </a:p>
+        </p:txBody>
+      </p:sp>
+      <p:sp>
+        <p:nvSpPr>
+          <p:cNvPr id="3" name="Content Placeholder 2"/>
+          <p:cNvSpPr>
+            <a:spLocks noGrp="1"/>
+          </p:cNvSpPr>
+          <p:nvPr>
+            <p:ph idx="1"/>
+          </p:nvPr>
+        </p:nvSpPr>
+        <p:spPr/>
+        <p:txBody>
+          <a:bodyPr/>
+          <a:lstStyle/>
+          <a:p>
+            <a:pPr lvl="1"/>
+            <a:r>
+              <a:rPr/>
+              <a:t>Nothing is ever outside my area of expertise!</a:t>
+            </a:r>
+          </a:p>
+          <a:p>
+            <a:pPr lvl="2"/>
+            <a:r>
+              <a:rPr/>
+              <a:t>Just kidding</a:t>
+            </a:r>
+          </a:p>
+          <a:p>
+            <a:pPr lvl="2"/>
+            <a:r>
+              <a:rPr/>
+              <a:t>But I do try to know a bit about everything</a:t>
+            </a:r>
+          </a:p>
+          <a:p>
+            <a:pPr lvl="1"/>
+            <a:r>
+              <a:rPr/>
+              <a:t>Opportunity to learn on the job</a:t>
+            </a:r>
+          </a:p>
+          <a:p>
+            <a:pPr lvl="2"/>
+            <a:r>
+              <a:rPr/>
+              <a:t>Books, short courses, Internet resources</a:t>
+            </a:r>
+          </a:p>
+          <a:p>
+            <a:pPr lvl="2"/>
+            <a:r>
+              <a:rPr/>
+              <a:t>Build a network of helpers</a:t>
+            </a:r>
+          </a:p>
+        </p:txBody>
+      </p:sp>
+    </p:spTree>
+  </p:cSld>
+</p:sld>
+</file>
+
+<file path=ppt/slides/slide21.xml><?xml version="1.0" encoding="utf-8"?>
+<p:sld xmlns:a="http://schemas.openxmlformats.org/drawingml/2006/main" xmlns:r="http://schemas.openxmlformats.org/officeDocument/2006/relationships" xmlns:p="http://schemas.openxmlformats.org/presentationml/2006/main">
+  <p:cSld>
+    <p:spTree>
+      <p:nvGrpSpPr>
+        <p:cNvPr id="1" name=""/>
+        <p:cNvGrpSpPr/>
+        <p:nvPr/>
+      </p:nvGrpSpPr>
+      <p:grpSpPr>
+        <a:xfrm>
+          <a:off x="0" y="0"/>
+          <a:ext cx="0" cy="0"/>
+          <a:chOff x="0" y="0"/>
+          <a:chExt cx="0" cy="0"/>
+        </a:xfrm>
+      </p:grpSpPr>
+      <p:sp>
+        <p:nvSpPr>
+          <p:cNvPr id="2" name="Title 1"/>
+          <p:cNvSpPr>
+            <a:spLocks noGrp="1"/>
+          </p:cNvSpPr>
+          <p:nvPr>
+            <p:ph type="title"/>
+          </p:nvPr>
+        </p:nvSpPr>
+        <p:spPr/>
+        <p:txBody>
+          <a:bodyPr/>
+          <a:lstStyle/>
+          <a:p>
+            <a:pPr lvl="0" marL="0" indent="0">
+              <a:buNone/>
+            </a:pPr>
+            <a:r>
+              <a:rPr/>
+              <a:t>What</a:t>
+            </a:r>
+            <a:r>
+              <a:rPr/>
+              <a:t> </a:t>
+            </a:r>
+            <a:r>
+              <a:rPr/>
+              <a:t>is</a:t>
+            </a:r>
+            <a:r>
+              <a:rPr/>
+              <a:t> </a:t>
+            </a:r>
+            <a:r>
+              <a:rPr/>
+              <a:t>an</a:t>
+            </a:r>
+            <a:r>
+              <a:rPr/>
+              <a:t> </a:t>
+            </a:r>
+            <a:r>
+              <a:rPr/>
+              <a:t>issue</a:t>
+            </a:r>
+            <a:r>
+              <a:rPr/>
+              <a:t> </a:t>
+            </a:r>
+            <a:r>
+              <a:rPr/>
+              <a:t>you</a:t>
+            </a:r>
+            <a:r>
+              <a:rPr/>
+              <a:t> </a:t>
+            </a:r>
+            <a:r>
+              <a:rPr/>
+              <a:t>have</a:t>
+            </a:r>
+            <a:r>
+              <a:rPr/>
+              <a:t> </a:t>
+            </a:r>
+            <a:r>
+              <a:rPr/>
+              <a:t>faced</a:t>
+            </a:r>
+            <a:r>
+              <a:rPr/>
+              <a:t> </a:t>
+            </a:r>
+            <a:r>
+              <a:rPr/>
+              <a:t>working</a:t>
+            </a:r>
+            <a:r>
+              <a:rPr/>
+              <a:t> </a:t>
+            </a:r>
+            <a:r>
+              <a:rPr/>
+              <a:t>with</a:t>
+            </a:r>
+            <a:r>
+              <a:rPr/>
+              <a:t> </a:t>
+            </a:r>
+            <a:r>
+              <a:rPr/>
+              <a:t>a</a:t>
+            </a:r>
+            <a:r>
+              <a:rPr/>
+              <a:t> </a:t>
+            </a:r>
+            <a:r>
+              <a:rPr/>
+              <a:t>client</a:t>
+            </a:r>
+            <a:r>
+              <a:rPr/>
+              <a:t> </a:t>
+            </a:r>
+            <a:r>
+              <a:rPr/>
+              <a:t>or</a:t>
+            </a:r>
+            <a:r>
+              <a:rPr/>
+              <a:t> </a:t>
+            </a:r>
+            <a:r>
+              <a:rPr/>
+              <a:t>collaborator,</a:t>
+            </a:r>
+            <a:r>
+              <a:rPr/>
+              <a:t> </a:t>
+            </a:r>
+            <a:r>
+              <a:rPr/>
+              <a:t>and</a:t>
+            </a:r>
+            <a:r>
+              <a:rPr/>
+              <a:t> </a:t>
+            </a:r>
+            <a:r>
+              <a:rPr/>
+              <a:t>what</a:t>
+            </a:r>
+            <a:r>
+              <a:rPr/>
+              <a:t> </a:t>
+            </a:r>
+            <a:r>
+              <a:rPr/>
+              <a:t>did</a:t>
+            </a:r>
+            <a:r>
+              <a:rPr/>
+              <a:t> </a:t>
+            </a:r>
+            <a:r>
+              <a:rPr/>
+              <a:t>you</a:t>
+            </a:r>
+            <a:r>
+              <a:rPr/>
+              <a:t> </a:t>
+            </a:r>
+            <a:r>
+              <a:rPr/>
+              <a:t>learn</a:t>
+            </a:r>
+            <a:r>
+              <a:rPr/>
+              <a:t> </a:t>
+            </a:r>
+            <a:r>
+              <a:rPr/>
+              <a:t>from</a:t>
+            </a:r>
+            <a:r>
+              <a:rPr/>
+              <a:t> </a:t>
+            </a:r>
+            <a:r>
+              <a:rPr/>
+              <a:t>it?</a:t>
+            </a:r>
+          </a:p>
+        </p:txBody>
+      </p:sp>
+      <p:sp>
+        <p:nvSpPr>
+          <p:cNvPr id="3" name="Content Placeholder 2"/>
+          <p:cNvSpPr>
+            <a:spLocks noGrp="1"/>
+          </p:cNvSpPr>
+          <p:nvPr>
+            <p:ph idx="1"/>
+          </p:nvPr>
+        </p:nvSpPr>
+        <p:spPr/>
+        <p:txBody>
+          <a:bodyPr/>
+          <a:lstStyle/>
+          <a:p>
+            <a:pPr lvl="1"/>
+            <a:r>
+              <a:rPr/>
+              <a:t>Get and give regular feedback</a:t>
+            </a:r>
+          </a:p>
+        </p:txBody>
+      </p:sp>
+    </p:spTree>
+  </p:cSld>
+</p:sld>
+</file>
+
+<file path=ppt/slides/slide22.xml><?xml version="1.0" encoding="utf-8"?>
+<p:sld xmlns:a="http://schemas.openxmlformats.org/drawingml/2006/main" xmlns:r="http://schemas.openxmlformats.org/officeDocument/2006/relationships" xmlns:p="http://schemas.openxmlformats.org/presentationml/2006/main">
+  <p:cSld>
+    <p:spTree>
+      <p:nvGrpSpPr>
+        <p:cNvPr id="1" name=""/>
+        <p:cNvGrpSpPr/>
+        <p:nvPr/>
+      </p:nvGrpSpPr>
+      <p:grpSpPr>
+        <a:xfrm>
+          <a:off x="0" y="0"/>
+          <a:ext cx="0" cy="0"/>
+          <a:chOff x="0" y="0"/>
+          <a:chExt cx="0" cy="0"/>
+        </a:xfrm>
+      </p:grpSpPr>
+      <p:sp>
+        <p:nvSpPr>
+          <p:cNvPr id="2" name="Title 1"/>
+          <p:cNvSpPr>
+            <a:spLocks noGrp="1"/>
+          </p:cNvSpPr>
+          <p:nvPr>
+            <p:ph type="title"/>
+          </p:nvPr>
+        </p:nvSpPr>
+        <p:spPr/>
+        <p:txBody>
+          <a:bodyPr/>
+          <a:lstStyle/>
+          <a:p>
+            <a:pPr lvl="0" marL="0" indent="0">
+              <a:buNone/>
+            </a:pPr>
+            <a:r>
+              <a:rPr/>
+              <a:t>What</a:t>
+            </a:r>
+            <a:r>
+              <a:rPr/>
+              <a:t> </a:t>
+            </a:r>
+            <a:r>
+              <a:rPr/>
+              <a:t>are</a:t>
+            </a:r>
+            <a:r>
+              <a:rPr/>
+              <a:t> </a:t>
+            </a:r>
+            <a:r>
+              <a:rPr/>
+              <a:t>some</a:t>
+            </a:r>
+            <a:r>
+              <a:rPr/>
+              <a:t> </a:t>
+            </a:r>
+            <a:r>
+              <a:rPr/>
+              <a:t>ethical</a:t>
+            </a:r>
+            <a:r>
+              <a:rPr/>
+              <a:t> </a:t>
+            </a:r>
+            <a:r>
+              <a:rPr/>
+              <a:t>dilemmas</a:t>
+            </a:r>
+            <a:r>
+              <a:rPr/>
+              <a:t> </a:t>
+            </a:r>
+            <a:r>
+              <a:rPr/>
+              <a:t>you</a:t>
+            </a:r>
+            <a:r>
+              <a:rPr/>
+              <a:t> </a:t>
+            </a:r>
+            <a:r>
+              <a:rPr/>
+              <a:t>have</a:t>
+            </a:r>
+            <a:r>
+              <a:rPr/>
+              <a:t> </a:t>
+            </a:r>
+            <a:r>
+              <a:rPr/>
+              <a:t>faced</a:t>
+            </a:r>
+            <a:r>
+              <a:rPr/>
+              <a:t> </a:t>
+            </a:r>
+            <a:r>
+              <a:rPr/>
+              <a:t>in</a:t>
+            </a:r>
+            <a:r>
+              <a:rPr/>
+              <a:t> </a:t>
+            </a:r>
+            <a:r>
+              <a:rPr/>
+              <a:t>your</a:t>
+            </a:r>
+            <a:r>
+              <a:rPr/>
+              <a:t> </a:t>
+            </a:r>
+            <a:r>
+              <a:rPr/>
+              <a:t>job?</a:t>
+            </a:r>
+          </a:p>
+        </p:txBody>
+      </p:sp>
+      <p:sp>
+        <p:nvSpPr>
+          <p:cNvPr id="3" name="Content Placeholder 2"/>
+          <p:cNvSpPr>
+            <a:spLocks noGrp="1"/>
+          </p:cNvSpPr>
+          <p:nvPr>
+            <p:ph idx="1"/>
+          </p:nvPr>
+        </p:nvSpPr>
+        <p:spPr/>
+        <p:txBody>
+          <a:bodyPr/>
+          <a:lstStyle/>
+          <a:p>
+            <a:pPr lvl="1"/>
+            <a:r>
+              <a:rPr/>
+              <a:t>Asking for the impossible</a:t>
+            </a:r>
+          </a:p>
+          <a:p>
+            <a:pPr lvl="2"/>
+            <a:r>
+              <a:rPr/>
+              <a:t>“Blood from a turnip” test</a:t>
             </a:r>
           </a:p>
         </p:txBody>

</xml_diff>